<commit_message>
The presentation that has been sent to RRH
</commit_message>
<xml_diff>
--- a/presentation/DaryllFinal.pptx
+++ b/presentation/DaryllFinal.pptx
@@ -26,9 +26,9 @@
     <p:sldId id="262" r:id="rId14"/>
     <p:sldId id="273" r:id="rId15"/>
     <p:sldId id="263" r:id="rId16"/>
-    <p:sldId id="276" r:id="rId17"/>
+    <p:sldId id="279" r:id="rId17"/>
     <p:sldId id="264" r:id="rId18"/>
-    <p:sldId id="279" r:id="rId19"/>
+    <p:sldId id="276" r:id="rId19"/>
     <p:sldId id="280" r:id="rId20"/>
   </p:sldIdLst>
   <p:sldSz cx="12192000" cy="6858000"/>
@@ -131,12 +131,12 @@
   <p:extLst>
     <p:ext uri="{EFAFB233-063F-42B5-8137-9DF3F51BA10A}">
       <p15:sldGuideLst xmlns:p15="http://schemas.microsoft.com/office/powerpoint/2012/main">
-        <p15:guide id="1" orient="horz" pos="2160" userDrawn="1">
+        <p15:guide id="1" orient="horz" pos="2137" userDrawn="1">
           <p15:clr>
             <a:srgbClr val="A4A3A4"/>
           </p15:clr>
         </p15:guide>
-        <p15:guide id="2" pos="7129" userDrawn="1">
+        <p15:guide id="2" pos="3840" userDrawn="1">
           <p15:clr>
             <a:srgbClr val="A4A3A4"/>
           </p15:clr>
@@ -690,6 +690,1518 @@
     </a:lvl9pPr>
   </p:notesStyle>
 </p:notesMaster>
+</file>
+
+<file path=ppt/notesSlides/notesSlide1.xml><?xml version="1.0" encoding="utf-8"?>
+<p:notes xmlns:a="http://schemas.openxmlformats.org/drawingml/2006/main" xmlns:r="http://schemas.openxmlformats.org/officeDocument/2006/relationships" xmlns:p="http://schemas.openxmlformats.org/presentationml/2006/main">
+  <p:cSld>
+    <p:spTree>
+      <p:nvGrpSpPr>
+        <p:cNvPr id="1" name=""/>
+        <p:cNvGrpSpPr/>
+        <p:nvPr/>
+      </p:nvGrpSpPr>
+      <p:grpSpPr>
+        <a:xfrm>
+          <a:off x="0" y="0"/>
+          <a:ext cx="0" cy="0"/>
+          <a:chOff x="0" y="0"/>
+          <a:chExt cx="0" cy="0"/>
+        </a:xfrm>
+      </p:grpSpPr>
+      <p:sp>
+        <p:nvSpPr>
+          <p:cNvPr id="2" name="Espace réservé de l'image des diapositives 1"/>
+          <p:cNvSpPr>
+            <a:spLocks noGrp="1" noRot="1" noChangeAspect="1"/>
+          </p:cNvSpPr>
+          <p:nvPr>
+            <p:ph type="sldImg"/>
+          </p:nvPr>
+        </p:nvSpPr>
+        <p:spPr/>
+      </p:sp>
+      <p:sp>
+        <p:nvSpPr>
+          <p:cNvPr id="3" name="Espace réservé des notes 2"/>
+          <p:cNvSpPr>
+            <a:spLocks noGrp="1"/>
+          </p:cNvSpPr>
+          <p:nvPr>
+            <p:ph type="body" idx="1"/>
+          </p:nvPr>
+        </p:nvSpPr>
+        <p:spPr/>
+        <p:txBody>
+          <a:bodyPr/>
+          <a:lstStyle/>
+          <a:p>
+            <a:endParaRPr lang="fr-CH" dirty="0"/>
+          </a:p>
+        </p:txBody>
+      </p:sp>
+      <p:sp>
+        <p:nvSpPr>
+          <p:cNvPr id="4" name="Espace réservé du numéro de diapositive 3"/>
+          <p:cNvSpPr>
+            <a:spLocks noGrp="1"/>
+          </p:cNvSpPr>
+          <p:nvPr>
+            <p:ph type="sldNum" sz="quarter" idx="10"/>
+          </p:nvPr>
+        </p:nvSpPr>
+        <p:spPr/>
+        <p:txBody>
+          <a:bodyPr/>
+          <a:lstStyle/>
+          <a:p>
+            <a:fld id="{3065D891-70D4-4D9A-B44B-CB5014DB94A4}" type="slidenum">
+              <a:rPr lang="fr-CH" smtClean="0"/>
+              <a:t>1</a:t>
+            </a:fld>
+            <a:endParaRPr lang="fr-CH"/>
+          </a:p>
+        </p:txBody>
+      </p:sp>
+    </p:spTree>
+    <p:extLst>
+      <p:ext uri="{BB962C8B-B14F-4D97-AF65-F5344CB8AC3E}">
+        <p14:creationId xmlns:p14="http://schemas.microsoft.com/office/powerpoint/2010/main" val="4061334584"/>
+      </p:ext>
+    </p:extLst>
+  </p:cSld>
+  <p:clrMapOvr>
+    <a:masterClrMapping/>
+  </p:clrMapOvr>
+</p:notes>
+</file>
+
+<file path=ppt/notesSlides/notesSlide10.xml><?xml version="1.0" encoding="utf-8"?>
+<p:notes xmlns:a="http://schemas.openxmlformats.org/drawingml/2006/main" xmlns:r="http://schemas.openxmlformats.org/officeDocument/2006/relationships" xmlns:p="http://schemas.openxmlformats.org/presentationml/2006/main">
+  <p:cSld>
+    <p:spTree>
+      <p:nvGrpSpPr>
+        <p:cNvPr id="1" name=""/>
+        <p:cNvGrpSpPr/>
+        <p:nvPr/>
+      </p:nvGrpSpPr>
+      <p:grpSpPr>
+        <a:xfrm>
+          <a:off x="0" y="0"/>
+          <a:ext cx="0" cy="0"/>
+          <a:chOff x="0" y="0"/>
+          <a:chExt cx="0" cy="0"/>
+        </a:xfrm>
+      </p:grpSpPr>
+      <p:sp>
+        <p:nvSpPr>
+          <p:cNvPr id="2" name="Espace réservé de l'image des diapositives 1"/>
+          <p:cNvSpPr>
+            <a:spLocks noGrp="1" noRot="1" noChangeAspect="1"/>
+          </p:cNvSpPr>
+          <p:nvPr>
+            <p:ph type="sldImg"/>
+          </p:nvPr>
+        </p:nvSpPr>
+        <p:spPr/>
+      </p:sp>
+      <p:sp>
+        <p:nvSpPr>
+          <p:cNvPr id="3" name="Espace réservé des notes 2"/>
+          <p:cNvSpPr>
+            <a:spLocks noGrp="1"/>
+          </p:cNvSpPr>
+          <p:nvPr>
+            <p:ph type="body" idx="1"/>
+          </p:nvPr>
+        </p:nvSpPr>
+        <p:spPr/>
+        <p:txBody>
+          <a:bodyPr/>
+          <a:lstStyle/>
+          <a:p>
+            <a:endParaRPr lang="fr-CH" dirty="0"/>
+          </a:p>
+        </p:txBody>
+      </p:sp>
+      <p:sp>
+        <p:nvSpPr>
+          <p:cNvPr id="4" name="Espace réservé du numéro de diapositive 3"/>
+          <p:cNvSpPr>
+            <a:spLocks noGrp="1"/>
+          </p:cNvSpPr>
+          <p:nvPr>
+            <p:ph type="sldNum" sz="quarter" idx="10"/>
+          </p:nvPr>
+        </p:nvSpPr>
+        <p:spPr/>
+        <p:txBody>
+          <a:bodyPr/>
+          <a:lstStyle/>
+          <a:p>
+            <a:fld id="{3065D891-70D4-4D9A-B44B-CB5014DB94A4}" type="slidenum">
+              <a:rPr lang="fr-CH" smtClean="0"/>
+              <a:t>10</a:t>
+            </a:fld>
+            <a:endParaRPr lang="fr-CH"/>
+          </a:p>
+        </p:txBody>
+      </p:sp>
+    </p:spTree>
+    <p:extLst>
+      <p:ext uri="{BB962C8B-B14F-4D97-AF65-F5344CB8AC3E}">
+        <p14:creationId xmlns:p14="http://schemas.microsoft.com/office/powerpoint/2010/main" val="4229758959"/>
+      </p:ext>
+    </p:extLst>
+  </p:cSld>
+  <p:clrMapOvr>
+    <a:masterClrMapping/>
+  </p:clrMapOvr>
+</p:notes>
+</file>
+
+<file path=ppt/notesSlides/notesSlide11.xml><?xml version="1.0" encoding="utf-8"?>
+<p:notes xmlns:a="http://schemas.openxmlformats.org/drawingml/2006/main" xmlns:r="http://schemas.openxmlformats.org/officeDocument/2006/relationships" xmlns:p="http://schemas.openxmlformats.org/presentationml/2006/main">
+  <p:cSld>
+    <p:spTree>
+      <p:nvGrpSpPr>
+        <p:cNvPr id="1" name=""/>
+        <p:cNvGrpSpPr/>
+        <p:nvPr/>
+      </p:nvGrpSpPr>
+      <p:grpSpPr>
+        <a:xfrm>
+          <a:off x="0" y="0"/>
+          <a:ext cx="0" cy="0"/>
+          <a:chOff x="0" y="0"/>
+          <a:chExt cx="0" cy="0"/>
+        </a:xfrm>
+      </p:grpSpPr>
+      <p:sp>
+        <p:nvSpPr>
+          <p:cNvPr id="2" name="Espace réservé de l'image des diapositives 1"/>
+          <p:cNvSpPr>
+            <a:spLocks noGrp="1" noRot="1" noChangeAspect="1"/>
+          </p:cNvSpPr>
+          <p:nvPr>
+            <p:ph type="sldImg"/>
+          </p:nvPr>
+        </p:nvSpPr>
+        <p:spPr/>
+      </p:sp>
+      <p:sp>
+        <p:nvSpPr>
+          <p:cNvPr id="3" name="Espace réservé des notes 2"/>
+          <p:cNvSpPr>
+            <a:spLocks noGrp="1"/>
+          </p:cNvSpPr>
+          <p:nvPr>
+            <p:ph type="body" idx="1"/>
+          </p:nvPr>
+        </p:nvSpPr>
+        <p:spPr/>
+        <p:txBody>
+          <a:bodyPr/>
+          <a:lstStyle/>
+          <a:p>
+            <a:endParaRPr lang="fr-CH" dirty="0"/>
+          </a:p>
+        </p:txBody>
+      </p:sp>
+      <p:sp>
+        <p:nvSpPr>
+          <p:cNvPr id="4" name="Espace réservé du numéro de diapositive 3"/>
+          <p:cNvSpPr>
+            <a:spLocks noGrp="1"/>
+          </p:cNvSpPr>
+          <p:nvPr>
+            <p:ph type="sldNum" sz="quarter" idx="10"/>
+          </p:nvPr>
+        </p:nvSpPr>
+        <p:spPr/>
+        <p:txBody>
+          <a:bodyPr/>
+          <a:lstStyle/>
+          <a:p>
+            <a:fld id="{3065D891-70D4-4D9A-B44B-CB5014DB94A4}" type="slidenum">
+              <a:rPr lang="fr-CH" smtClean="0"/>
+              <a:t>11</a:t>
+            </a:fld>
+            <a:endParaRPr lang="fr-CH"/>
+          </a:p>
+        </p:txBody>
+      </p:sp>
+    </p:spTree>
+    <p:extLst>
+      <p:ext uri="{BB962C8B-B14F-4D97-AF65-F5344CB8AC3E}">
+        <p14:creationId xmlns:p14="http://schemas.microsoft.com/office/powerpoint/2010/main" val="535148264"/>
+      </p:ext>
+    </p:extLst>
+  </p:cSld>
+  <p:clrMapOvr>
+    <a:masterClrMapping/>
+  </p:clrMapOvr>
+</p:notes>
+</file>
+
+<file path=ppt/notesSlides/notesSlide12.xml><?xml version="1.0" encoding="utf-8"?>
+<p:notes xmlns:a="http://schemas.openxmlformats.org/drawingml/2006/main" xmlns:r="http://schemas.openxmlformats.org/officeDocument/2006/relationships" xmlns:p="http://schemas.openxmlformats.org/presentationml/2006/main">
+  <p:cSld>
+    <p:spTree>
+      <p:nvGrpSpPr>
+        <p:cNvPr id="1" name=""/>
+        <p:cNvGrpSpPr/>
+        <p:nvPr/>
+      </p:nvGrpSpPr>
+      <p:grpSpPr>
+        <a:xfrm>
+          <a:off x="0" y="0"/>
+          <a:ext cx="0" cy="0"/>
+          <a:chOff x="0" y="0"/>
+          <a:chExt cx="0" cy="0"/>
+        </a:xfrm>
+      </p:grpSpPr>
+      <p:sp>
+        <p:nvSpPr>
+          <p:cNvPr id="2" name="Espace réservé de l'image des diapositives 1"/>
+          <p:cNvSpPr>
+            <a:spLocks noGrp="1" noRot="1" noChangeAspect="1"/>
+          </p:cNvSpPr>
+          <p:nvPr>
+            <p:ph type="sldImg"/>
+          </p:nvPr>
+        </p:nvSpPr>
+        <p:spPr/>
+      </p:sp>
+      <p:sp>
+        <p:nvSpPr>
+          <p:cNvPr id="3" name="Espace réservé des notes 2"/>
+          <p:cNvSpPr>
+            <a:spLocks noGrp="1"/>
+          </p:cNvSpPr>
+          <p:nvPr>
+            <p:ph type="body" idx="1"/>
+          </p:nvPr>
+        </p:nvSpPr>
+        <p:spPr/>
+        <p:txBody>
+          <a:bodyPr/>
+          <a:lstStyle/>
+          <a:p>
+            <a:endParaRPr lang="fr-CH" dirty="0"/>
+          </a:p>
+        </p:txBody>
+      </p:sp>
+      <p:sp>
+        <p:nvSpPr>
+          <p:cNvPr id="4" name="Espace réservé du numéro de diapositive 3"/>
+          <p:cNvSpPr>
+            <a:spLocks noGrp="1"/>
+          </p:cNvSpPr>
+          <p:nvPr>
+            <p:ph type="sldNum" sz="quarter" idx="10"/>
+          </p:nvPr>
+        </p:nvSpPr>
+        <p:spPr/>
+        <p:txBody>
+          <a:bodyPr/>
+          <a:lstStyle/>
+          <a:p>
+            <a:fld id="{3065D891-70D4-4D9A-B44B-CB5014DB94A4}" type="slidenum">
+              <a:rPr lang="fr-CH" smtClean="0"/>
+              <a:t>12</a:t>
+            </a:fld>
+            <a:endParaRPr lang="fr-CH"/>
+          </a:p>
+        </p:txBody>
+      </p:sp>
+    </p:spTree>
+    <p:extLst>
+      <p:ext uri="{BB962C8B-B14F-4D97-AF65-F5344CB8AC3E}">
+        <p14:creationId xmlns:p14="http://schemas.microsoft.com/office/powerpoint/2010/main" val="1028601230"/>
+      </p:ext>
+    </p:extLst>
+  </p:cSld>
+  <p:clrMapOvr>
+    <a:masterClrMapping/>
+  </p:clrMapOvr>
+</p:notes>
+</file>
+
+<file path=ppt/notesSlides/notesSlide13.xml><?xml version="1.0" encoding="utf-8"?>
+<p:notes xmlns:a="http://schemas.openxmlformats.org/drawingml/2006/main" xmlns:r="http://schemas.openxmlformats.org/officeDocument/2006/relationships" xmlns:p="http://schemas.openxmlformats.org/presentationml/2006/main">
+  <p:cSld>
+    <p:spTree>
+      <p:nvGrpSpPr>
+        <p:cNvPr id="1" name=""/>
+        <p:cNvGrpSpPr/>
+        <p:nvPr/>
+      </p:nvGrpSpPr>
+      <p:grpSpPr>
+        <a:xfrm>
+          <a:off x="0" y="0"/>
+          <a:ext cx="0" cy="0"/>
+          <a:chOff x="0" y="0"/>
+          <a:chExt cx="0" cy="0"/>
+        </a:xfrm>
+      </p:grpSpPr>
+      <p:sp>
+        <p:nvSpPr>
+          <p:cNvPr id="2" name="Espace réservé de l'image des diapositives 1"/>
+          <p:cNvSpPr>
+            <a:spLocks noGrp="1" noRot="1" noChangeAspect="1"/>
+          </p:cNvSpPr>
+          <p:nvPr>
+            <p:ph type="sldImg"/>
+          </p:nvPr>
+        </p:nvSpPr>
+        <p:spPr/>
+      </p:sp>
+      <p:sp>
+        <p:nvSpPr>
+          <p:cNvPr id="3" name="Espace réservé des notes 2"/>
+          <p:cNvSpPr>
+            <a:spLocks noGrp="1"/>
+          </p:cNvSpPr>
+          <p:nvPr>
+            <p:ph type="body" idx="1"/>
+          </p:nvPr>
+        </p:nvSpPr>
+        <p:spPr/>
+        <p:txBody>
+          <a:bodyPr/>
+          <a:lstStyle/>
+          <a:p>
+            <a:endParaRPr lang="fr-CH" dirty="0"/>
+          </a:p>
+        </p:txBody>
+      </p:sp>
+      <p:sp>
+        <p:nvSpPr>
+          <p:cNvPr id="4" name="Espace réservé du numéro de diapositive 3"/>
+          <p:cNvSpPr>
+            <a:spLocks noGrp="1"/>
+          </p:cNvSpPr>
+          <p:nvPr>
+            <p:ph type="sldNum" sz="quarter" idx="10"/>
+          </p:nvPr>
+        </p:nvSpPr>
+        <p:spPr/>
+        <p:txBody>
+          <a:bodyPr/>
+          <a:lstStyle/>
+          <a:p>
+            <a:fld id="{3065D891-70D4-4D9A-B44B-CB5014DB94A4}" type="slidenum">
+              <a:rPr lang="fr-CH" smtClean="0"/>
+              <a:t>13</a:t>
+            </a:fld>
+            <a:endParaRPr lang="fr-CH"/>
+          </a:p>
+        </p:txBody>
+      </p:sp>
+    </p:spTree>
+    <p:extLst>
+      <p:ext uri="{BB962C8B-B14F-4D97-AF65-F5344CB8AC3E}">
+        <p14:creationId xmlns:p14="http://schemas.microsoft.com/office/powerpoint/2010/main" val="2437523731"/>
+      </p:ext>
+    </p:extLst>
+  </p:cSld>
+  <p:clrMapOvr>
+    <a:masterClrMapping/>
+  </p:clrMapOvr>
+</p:notes>
+</file>
+
+<file path=ppt/notesSlides/notesSlide14.xml><?xml version="1.0" encoding="utf-8"?>
+<p:notes xmlns:a="http://schemas.openxmlformats.org/drawingml/2006/main" xmlns:r="http://schemas.openxmlformats.org/officeDocument/2006/relationships" xmlns:p="http://schemas.openxmlformats.org/presentationml/2006/main">
+  <p:cSld>
+    <p:spTree>
+      <p:nvGrpSpPr>
+        <p:cNvPr id="1" name=""/>
+        <p:cNvGrpSpPr/>
+        <p:nvPr/>
+      </p:nvGrpSpPr>
+      <p:grpSpPr>
+        <a:xfrm>
+          <a:off x="0" y="0"/>
+          <a:ext cx="0" cy="0"/>
+          <a:chOff x="0" y="0"/>
+          <a:chExt cx="0" cy="0"/>
+        </a:xfrm>
+      </p:grpSpPr>
+      <p:sp>
+        <p:nvSpPr>
+          <p:cNvPr id="2" name="Espace réservé de l'image des diapositives 1"/>
+          <p:cNvSpPr>
+            <a:spLocks noGrp="1" noRot="1" noChangeAspect="1"/>
+          </p:cNvSpPr>
+          <p:nvPr>
+            <p:ph type="sldImg"/>
+          </p:nvPr>
+        </p:nvSpPr>
+        <p:spPr/>
+      </p:sp>
+      <p:sp>
+        <p:nvSpPr>
+          <p:cNvPr id="3" name="Espace réservé des notes 2"/>
+          <p:cNvSpPr>
+            <a:spLocks noGrp="1"/>
+          </p:cNvSpPr>
+          <p:nvPr>
+            <p:ph type="body" idx="1"/>
+          </p:nvPr>
+        </p:nvSpPr>
+        <p:spPr/>
+        <p:txBody>
+          <a:bodyPr/>
+          <a:lstStyle/>
+          <a:p>
+            <a:endParaRPr lang="fr-CH" dirty="0"/>
+          </a:p>
+        </p:txBody>
+      </p:sp>
+      <p:sp>
+        <p:nvSpPr>
+          <p:cNvPr id="4" name="Espace réservé du numéro de diapositive 3"/>
+          <p:cNvSpPr>
+            <a:spLocks noGrp="1"/>
+          </p:cNvSpPr>
+          <p:nvPr>
+            <p:ph type="sldNum" sz="quarter" idx="10"/>
+          </p:nvPr>
+        </p:nvSpPr>
+        <p:spPr/>
+        <p:txBody>
+          <a:bodyPr/>
+          <a:lstStyle/>
+          <a:p>
+            <a:fld id="{3065D891-70D4-4D9A-B44B-CB5014DB94A4}" type="slidenum">
+              <a:rPr lang="fr-CH" smtClean="0"/>
+              <a:t>14</a:t>
+            </a:fld>
+            <a:endParaRPr lang="fr-CH"/>
+          </a:p>
+        </p:txBody>
+      </p:sp>
+    </p:spTree>
+    <p:extLst>
+      <p:ext uri="{BB962C8B-B14F-4D97-AF65-F5344CB8AC3E}">
+        <p14:creationId xmlns:p14="http://schemas.microsoft.com/office/powerpoint/2010/main" val="1062082113"/>
+      </p:ext>
+    </p:extLst>
+  </p:cSld>
+  <p:clrMapOvr>
+    <a:masterClrMapping/>
+  </p:clrMapOvr>
+</p:notes>
+</file>
+
+<file path=ppt/notesSlides/notesSlide15.xml><?xml version="1.0" encoding="utf-8"?>
+<p:notes xmlns:a="http://schemas.openxmlformats.org/drawingml/2006/main" xmlns:r="http://schemas.openxmlformats.org/officeDocument/2006/relationships" xmlns:p="http://schemas.openxmlformats.org/presentationml/2006/main">
+  <p:cSld>
+    <p:spTree>
+      <p:nvGrpSpPr>
+        <p:cNvPr id="1" name=""/>
+        <p:cNvGrpSpPr/>
+        <p:nvPr/>
+      </p:nvGrpSpPr>
+      <p:grpSpPr>
+        <a:xfrm>
+          <a:off x="0" y="0"/>
+          <a:ext cx="0" cy="0"/>
+          <a:chOff x="0" y="0"/>
+          <a:chExt cx="0" cy="0"/>
+        </a:xfrm>
+      </p:grpSpPr>
+      <p:sp>
+        <p:nvSpPr>
+          <p:cNvPr id="2" name="Espace réservé de l'image des diapositives 1"/>
+          <p:cNvSpPr>
+            <a:spLocks noGrp="1" noRot="1" noChangeAspect="1"/>
+          </p:cNvSpPr>
+          <p:nvPr>
+            <p:ph type="sldImg"/>
+          </p:nvPr>
+        </p:nvSpPr>
+        <p:spPr/>
+      </p:sp>
+      <p:sp>
+        <p:nvSpPr>
+          <p:cNvPr id="3" name="Espace réservé des notes 2"/>
+          <p:cNvSpPr>
+            <a:spLocks noGrp="1"/>
+          </p:cNvSpPr>
+          <p:nvPr>
+            <p:ph type="body" idx="1"/>
+          </p:nvPr>
+        </p:nvSpPr>
+        <p:spPr/>
+        <p:txBody>
+          <a:bodyPr/>
+          <a:lstStyle/>
+          <a:p>
+            <a:endParaRPr lang="fr-CH" dirty="0"/>
+          </a:p>
+        </p:txBody>
+      </p:sp>
+      <p:sp>
+        <p:nvSpPr>
+          <p:cNvPr id="4" name="Espace réservé du numéro de diapositive 3"/>
+          <p:cNvSpPr>
+            <a:spLocks noGrp="1"/>
+          </p:cNvSpPr>
+          <p:nvPr>
+            <p:ph type="sldNum" sz="quarter" idx="10"/>
+          </p:nvPr>
+        </p:nvSpPr>
+        <p:spPr/>
+        <p:txBody>
+          <a:bodyPr/>
+          <a:lstStyle/>
+          <a:p>
+            <a:fld id="{3065D891-70D4-4D9A-B44B-CB5014DB94A4}" type="slidenum">
+              <a:rPr lang="fr-CH" smtClean="0"/>
+              <a:t>15</a:t>
+            </a:fld>
+            <a:endParaRPr lang="fr-CH"/>
+          </a:p>
+        </p:txBody>
+      </p:sp>
+    </p:spTree>
+    <p:extLst>
+      <p:ext uri="{BB962C8B-B14F-4D97-AF65-F5344CB8AC3E}">
+        <p14:creationId xmlns:p14="http://schemas.microsoft.com/office/powerpoint/2010/main" val="4153499293"/>
+      </p:ext>
+    </p:extLst>
+  </p:cSld>
+  <p:clrMapOvr>
+    <a:masterClrMapping/>
+  </p:clrMapOvr>
+</p:notes>
+</file>
+
+<file path=ppt/notesSlides/notesSlide16.xml><?xml version="1.0" encoding="utf-8"?>
+<p:notes xmlns:a="http://schemas.openxmlformats.org/drawingml/2006/main" xmlns:r="http://schemas.openxmlformats.org/officeDocument/2006/relationships" xmlns:p="http://schemas.openxmlformats.org/presentationml/2006/main">
+  <p:cSld>
+    <p:spTree>
+      <p:nvGrpSpPr>
+        <p:cNvPr id="1" name=""/>
+        <p:cNvGrpSpPr/>
+        <p:nvPr/>
+      </p:nvGrpSpPr>
+      <p:grpSpPr>
+        <a:xfrm>
+          <a:off x="0" y="0"/>
+          <a:ext cx="0" cy="0"/>
+          <a:chOff x="0" y="0"/>
+          <a:chExt cx="0" cy="0"/>
+        </a:xfrm>
+      </p:grpSpPr>
+      <p:sp>
+        <p:nvSpPr>
+          <p:cNvPr id="2" name="Espace réservé de l'image des diapositives 1"/>
+          <p:cNvSpPr>
+            <a:spLocks noGrp="1" noRot="1" noChangeAspect="1"/>
+          </p:cNvSpPr>
+          <p:nvPr>
+            <p:ph type="sldImg"/>
+          </p:nvPr>
+        </p:nvSpPr>
+        <p:spPr/>
+      </p:sp>
+      <p:sp>
+        <p:nvSpPr>
+          <p:cNvPr id="3" name="Espace réservé des notes 2"/>
+          <p:cNvSpPr>
+            <a:spLocks noGrp="1"/>
+          </p:cNvSpPr>
+          <p:nvPr>
+            <p:ph type="body" idx="1"/>
+          </p:nvPr>
+        </p:nvSpPr>
+        <p:spPr/>
+        <p:txBody>
+          <a:bodyPr/>
+          <a:lstStyle/>
+          <a:p>
+            <a:endParaRPr lang="fr-CH" dirty="0"/>
+          </a:p>
+        </p:txBody>
+      </p:sp>
+      <p:sp>
+        <p:nvSpPr>
+          <p:cNvPr id="4" name="Espace réservé du numéro de diapositive 3"/>
+          <p:cNvSpPr>
+            <a:spLocks noGrp="1"/>
+          </p:cNvSpPr>
+          <p:nvPr>
+            <p:ph type="sldNum" sz="quarter" idx="10"/>
+          </p:nvPr>
+        </p:nvSpPr>
+        <p:spPr/>
+        <p:txBody>
+          <a:bodyPr/>
+          <a:lstStyle/>
+          <a:p>
+            <a:fld id="{3065D891-70D4-4D9A-B44B-CB5014DB94A4}" type="slidenum">
+              <a:rPr lang="fr-CH" smtClean="0"/>
+              <a:t>16</a:t>
+            </a:fld>
+            <a:endParaRPr lang="fr-CH"/>
+          </a:p>
+        </p:txBody>
+      </p:sp>
+    </p:spTree>
+    <p:extLst>
+      <p:ext uri="{BB962C8B-B14F-4D97-AF65-F5344CB8AC3E}">
+        <p14:creationId xmlns:p14="http://schemas.microsoft.com/office/powerpoint/2010/main" val="1290861015"/>
+      </p:ext>
+    </p:extLst>
+  </p:cSld>
+  <p:clrMapOvr>
+    <a:masterClrMapping/>
+  </p:clrMapOvr>
+</p:notes>
+</file>
+
+<file path=ppt/notesSlides/notesSlide17.xml><?xml version="1.0" encoding="utf-8"?>
+<p:notes xmlns:a="http://schemas.openxmlformats.org/drawingml/2006/main" xmlns:r="http://schemas.openxmlformats.org/officeDocument/2006/relationships" xmlns:p="http://schemas.openxmlformats.org/presentationml/2006/main">
+  <p:cSld>
+    <p:spTree>
+      <p:nvGrpSpPr>
+        <p:cNvPr id="1" name=""/>
+        <p:cNvGrpSpPr/>
+        <p:nvPr/>
+      </p:nvGrpSpPr>
+      <p:grpSpPr>
+        <a:xfrm>
+          <a:off x="0" y="0"/>
+          <a:ext cx="0" cy="0"/>
+          <a:chOff x="0" y="0"/>
+          <a:chExt cx="0" cy="0"/>
+        </a:xfrm>
+      </p:grpSpPr>
+      <p:sp>
+        <p:nvSpPr>
+          <p:cNvPr id="2" name="Espace réservé de l'image des diapositives 1"/>
+          <p:cNvSpPr>
+            <a:spLocks noGrp="1" noRot="1" noChangeAspect="1"/>
+          </p:cNvSpPr>
+          <p:nvPr>
+            <p:ph type="sldImg"/>
+          </p:nvPr>
+        </p:nvSpPr>
+        <p:spPr/>
+      </p:sp>
+      <p:sp>
+        <p:nvSpPr>
+          <p:cNvPr id="3" name="Espace réservé des notes 2"/>
+          <p:cNvSpPr>
+            <a:spLocks noGrp="1"/>
+          </p:cNvSpPr>
+          <p:nvPr>
+            <p:ph type="body" idx="1"/>
+          </p:nvPr>
+        </p:nvSpPr>
+        <p:spPr/>
+        <p:txBody>
+          <a:bodyPr/>
+          <a:lstStyle/>
+          <a:p>
+            <a:endParaRPr lang="fr-CH" dirty="0"/>
+          </a:p>
+        </p:txBody>
+      </p:sp>
+      <p:sp>
+        <p:nvSpPr>
+          <p:cNvPr id="4" name="Espace réservé du numéro de diapositive 3"/>
+          <p:cNvSpPr>
+            <a:spLocks noGrp="1"/>
+          </p:cNvSpPr>
+          <p:nvPr>
+            <p:ph type="sldNum" sz="quarter" idx="10"/>
+          </p:nvPr>
+        </p:nvSpPr>
+        <p:spPr/>
+        <p:txBody>
+          <a:bodyPr/>
+          <a:lstStyle/>
+          <a:p>
+            <a:fld id="{3065D891-70D4-4D9A-B44B-CB5014DB94A4}" type="slidenum">
+              <a:rPr lang="fr-CH" smtClean="0"/>
+              <a:t>17</a:t>
+            </a:fld>
+            <a:endParaRPr lang="fr-CH"/>
+          </a:p>
+        </p:txBody>
+      </p:sp>
+    </p:spTree>
+    <p:extLst>
+      <p:ext uri="{BB962C8B-B14F-4D97-AF65-F5344CB8AC3E}">
+        <p14:creationId xmlns:p14="http://schemas.microsoft.com/office/powerpoint/2010/main" val="117430594"/>
+      </p:ext>
+    </p:extLst>
+  </p:cSld>
+  <p:clrMapOvr>
+    <a:masterClrMapping/>
+  </p:clrMapOvr>
+</p:notes>
+</file>
+
+<file path=ppt/notesSlides/notesSlide18.xml><?xml version="1.0" encoding="utf-8"?>
+<p:notes xmlns:a="http://schemas.openxmlformats.org/drawingml/2006/main" xmlns:r="http://schemas.openxmlformats.org/officeDocument/2006/relationships" xmlns:p="http://schemas.openxmlformats.org/presentationml/2006/main">
+  <p:cSld>
+    <p:spTree>
+      <p:nvGrpSpPr>
+        <p:cNvPr id="1" name=""/>
+        <p:cNvGrpSpPr/>
+        <p:nvPr/>
+      </p:nvGrpSpPr>
+      <p:grpSpPr>
+        <a:xfrm>
+          <a:off x="0" y="0"/>
+          <a:ext cx="0" cy="0"/>
+          <a:chOff x="0" y="0"/>
+          <a:chExt cx="0" cy="0"/>
+        </a:xfrm>
+      </p:grpSpPr>
+      <p:sp>
+        <p:nvSpPr>
+          <p:cNvPr id="2" name="Espace réservé de l'image des diapositives 1"/>
+          <p:cNvSpPr>
+            <a:spLocks noGrp="1" noRot="1" noChangeAspect="1"/>
+          </p:cNvSpPr>
+          <p:nvPr>
+            <p:ph type="sldImg"/>
+          </p:nvPr>
+        </p:nvSpPr>
+        <p:spPr/>
+      </p:sp>
+      <p:sp>
+        <p:nvSpPr>
+          <p:cNvPr id="3" name="Espace réservé des notes 2"/>
+          <p:cNvSpPr>
+            <a:spLocks noGrp="1"/>
+          </p:cNvSpPr>
+          <p:nvPr>
+            <p:ph type="body" idx="1"/>
+          </p:nvPr>
+        </p:nvSpPr>
+        <p:spPr/>
+        <p:txBody>
+          <a:bodyPr/>
+          <a:lstStyle/>
+          <a:p>
+            <a:endParaRPr lang="fr-CH" dirty="0"/>
+          </a:p>
+        </p:txBody>
+      </p:sp>
+      <p:sp>
+        <p:nvSpPr>
+          <p:cNvPr id="4" name="Espace réservé du numéro de diapositive 3"/>
+          <p:cNvSpPr>
+            <a:spLocks noGrp="1"/>
+          </p:cNvSpPr>
+          <p:nvPr>
+            <p:ph type="sldNum" sz="quarter" idx="10"/>
+          </p:nvPr>
+        </p:nvSpPr>
+        <p:spPr/>
+        <p:txBody>
+          <a:bodyPr/>
+          <a:lstStyle/>
+          <a:p>
+            <a:fld id="{3065D891-70D4-4D9A-B44B-CB5014DB94A4}" type="slidenum">
+              <a:rPr lang="fr-CH" smtClean="0"/>
+              <a:t>18</a:t>
+            </a:fld>
+            <a:endParaRPr lang="fr-CH"/>
+          </a:p>
+        </p:txBody>
+      </p:sp>
+    </p:spTree>
+    <p:extLst>
+      <p:ext uri="{BB962C8B-B14F-4D97-AF65-F5344CB8AC3E}">
+        <p14:creationId xmlns:p14="http://schemas.microsoft.com/office/powerpoint/2010/main" val="4079630825"/>
+      </p:ext>
+    </p:extLst>
+  </p:cSld>
+  <p:clrMapOvr>
+    <a:masterClrMapping/>
+  </p:clrMapOvr>
+</p:notes>
+</file>
+
+<file path=ppt/notesSlides/notesSlide2.xml><?xml version="1.0" encoding="utf-8"?>
+<p:notes xmlns:a="http://schemas.openxmlformats.org/drawingml/2006/main" xmlns:r="http://schemas.openxmlformats.org/officeDocument/2006/relationships" xmlns:p="http://schemas.openxmlformats.org/presentationml/2006/main">
+  <p:cSld>
+    <p:spTree>
+      <p:nvGrpSpPr>
+        <p:cNvPr id="1" name=""/>
+        <p:cNvGrpSpPr/>
+        <p:nvPr/>
+      </p:nvGrpSpPr>
+      <p:grpSpPr>
+        <a:xfrm>
+          <a:off x="0" y="0"/>
+          <a:ext cx="0" cy="0"/>
+          <a:chOff x="0" y="0"/>
+          <a:chExt cx="0" cy="0"/>
+        </a:xfrm>
+      </p:grpSpPr>
+      <p:sp>
+        <p:nvSpPr>
+          <p:cNvPr id="2" name="Espace réservé de l'image des diapositives 1"/>
+          <p:cNvSpPr>
+            <a:spLocks noGrp="1" noRot="1" noChangeAspect="1"/>
+          </p:cNvSpPr>
+          <p:nvPr>
+            <p:ph type="sldImg"/>
+          </p:nvPr>
+        </p:nvSpPr>
+        <p:spPr/>
+      </p:sp>
+      <p:sp>
+        <p:nvSpPr>
+          <p:cNvPr id="3" name="Espace réservé des notes 2"/>
+          <p:cNvSpPr>
+            <a:spLocks noGrp="1"/>
+          </p:cNvSpPr>
+          <p:nvPr>
+            <p:ph type="body" idx="1"/>
+          </p:nvPr>
+        </p:nvSpPr>
+        <p:spPr/>
+        <p:txBody>
+          <a:bodyPr/>
+          <a:lstStyle/>
+          <a:p>
+            <a:endParaRPr lang="fr-CH" dirty="0"/>
+          </a:p>
+        </p:txBody>
+      </p:sp>
+      <p:sp>
+        <p:nvSpPr>
+          <p:cNvPr id="4" name="Espace réservé du numéro de diapositive 3"/>
+          <p:cNvSpPr>
+            <a:spLocks noGrp="1"/>
+          </p:cNvSpPr>
+          <p:nvPr>
+            <p:ph type="sldNum" sz="quarter" idx="10"/>
+          </p:nvPr>
+        </p:nvSpPr>
+        <p:spPr/>
+        <p:txBody>
+          <a:bodyPr/>
+          <a:lstStyle/>
+          <a:p>
+            <a:fld id="{3065D891-70D4-4D9A-B44B-CB5014DB94A4}" type="slidenum">
+              <a:rPr lang="fr-CH" smtClean="0"/>
+              <a:t>2</a:t>
+            </a:fld>
+            <a:endParaRPr lang="fr-CH"/>
+          </a:p>
+        </p:txBody>
+      </p:sp>
+    </p:spTree>
+    <p:extLst>
+      <p:ext uri="{BB962C8B-B14F-4D97-AF65-F5344CB8AC3E}">
+        <p14:creationId xmlns:p14="http://schemas.microsoft.com/office/powerpoint/2010/main" val="2989399105"/>
+      </p:ext>
+    </p:extLst>
+  </p:cSld>
+  <p:clrMapOvr>
+    <a:masterClrMapping/>
+  </p:clrMapOvr>
+</p:notes>
+</file>
+
+<file path=ppt/notesSlides/notesSlide3.xml><?xml version="1.0" encoding="utf-8"?>
+<p:notes xmlns:a="http://schemas.openxmlformats.org/drawingml/2006/main" xmlns:r="http://schemas.openxmlformats.org/officeDocument/2006/relationships" xmlns:p="http://schemas.openxmlformats.org/presentationml/2006/main">
+  <p:cSld>
+    <p:spTree>
+      <p:nvGrpSpPr>
+        <p:cNvPr id="1" name=""/>
+        <p:cNvGrpSpPr/>
+        <p:nvPr/>
+      </p:nvGrpSpPr>
+      <p:grpSpPr>
+        <a:xfrm>
+          <a:off x="0" y="0"/>
+          <a:ext cx="0" cy="0"/>
+          <a:chOff x="0" y="0"/>
+          <a:chExt cx="0" cy="0"/>
+        </a:xfrm>
+      </p:grpSpPr>
+      <p:sp>
+        <p:nvSpPr>
+          <p:cNvPr id="2" name="Espace réservé de l'image des diapositives 1"/>
+          <p:cNvSpPr>
+            <a:spLocks noGrp="1" noRot="1" noChangeAspect="1"/>
+          </p:cNvSpPr>
+          <p:nvPr>
+            <p:ph type="sldImg"/>
+          </p:nvPr>
+        </p:nvSpPr>
+        <p:spPr/>
+      </p:sp>
+      <p:sp>
+        <p:nvSpPr>
+          <p:cNvPr id="3" name="Espace réservé des notes 2"/>
+          <p:cNvSpPr>
+            <a:spLocks noGrp="1"/>
+          </p:cNvSpPr>
+          <p:nvPr>
+            <p:ph type="body" idx="1"/>
+          </p:nvPr>
+        </p:nvSpPr>
+        <p:spPr/>
+        <p:txBody>
+          <a:bodyPr/>
+          <a:lstStyle/>
+          <a:p>
+            <a:endParaRPr lang="fr-CH" dirty="0"/>
+          </a:p>
+        </p:txBody>
+      </p:sp>
+      <p:sp>
+        <p:nvSpPr>
+          <p:cNvPr id="4" name="Espace réservé du numéro de diapositive 3"/>
+          <p:cNvSpPr>
+            <a:spLocks noGrp="1"/>
+          </p:cNvSpPr>
+          <p:nvPr>
+            <p:ph type="sldNum" sz="quarter" idx="10"/>
+          </p:nvPr>
+        </p:nvSpPr>
+        <p:spPr/>
+        <p:txBody>
+          <a:bodyPr/>
+          <a:lstStyle/>
+          <a:p>
+            <a:fld id="{3065D891-70D4-4D9A-B44B-CB5014DB94A4}" type="slidenum">
+              <a:rPr lang="fr-CH" smtClean="0"/>
+              <a:t>3</a:t>
+            </a:fld>
+            <a:endParaRPr lang="fr-CH"/>
+          </a:p>
+        </p:txBody>
+      </p:sp>
+    </p:spTree>
+    <p:extLst>
+      <p:ext uri="{BB962C8B-B14F-4D97-AF65-F5344CB8AC3E}">
+        <p14:creationId xmlns:p14="http://schemas.microsoft.com/office/powerpoint/2010/main" val="2797008819"/>
+      </p:ext>
+    </p:extLst>
+  </p:cSld>
+  <p:clrMapOvr>
+    <a:masterClrMapping/>
+  </p:clrMapOvr>
+</p:notes>
+</file>
+
+<file path=ppt/notesSlides/notesSlide4.xml><?xml version="1.0" encoding="utf-8"?>
+<p:notes xmlns:a="http://schemas.openxmlformats.org/drawingml/2006/main" xmlns:r="http://schemas.openxmlformats.org/officeDocument/2006/relationships" xmlns:p="http://schemas.openxmlformats.org/presentationml/2006/main">
+  <p:cSld>
+    <p:spTree>
+      <p:nvGrpSpPr>
+        <p:cNvPr id="1" name=""/>
+        <p:cNvGrpSpPr/>
+        <p:nvPr/>
+      </p:nvGrpSpPr>
+      <p:grpSpPr>
+        <a:xfrm>
+          <a:off x="0" y="0"/>
+          <a:ext cx="0" cy="0"/>
+          <a:chOff x="0" y="0"/>
+          <a:chExt cx="0" cy="0"/>
+        </a:xfrm>
+      </p:grpSpPr>
+      <p:sp>
+        <p:nvSpPr>
+          <p:cNvPr id="2" name="Espace réservé de l'image des diapositives 1"/>
+          <p:cNvSpPr>
+            <a:spLocks noGrp="1" noRot="1" noChangeAspect="1"/>
+          </p:cNvSpPr>
+          <p:nvPr>
+            <p:ph type="sldImg"/>
+          </p:nvPr>
+        </p:nvSpPr>
+        <p:spPr/>
+      </p:sp>
+      <p:sp>
+        <p:nvSpPr>
+          <p:cNvPr id="3" name="Espace réservé des notes 2"/>
+          <p:cNvSpPr>
+            <a:spLocks noGrp="1"/>
+          </p:cNvSpPr>
+          <p:nvPr>
+            <p:ph type="body" idx="1"/>
+          </p:nvPr>
+        </p:nvSpPr>
+        <p:spPr/>
+        <p:txBody>
+          <a:bodyPr/>
+          <a:lstStyle/>
+          <a:p>
+            <a:endParaRPr lang="fr-CH" dirty="0"/>
+          </a:p>
+        </p:txBody>
+      </p:sp>
+      <p:sp>
+        <p:nvSpPr>
+          <p:cNvPr id="4" name="Espace réservé du numéro de diapositive 3"/>
+          <p:cNvSpPr>
+            <a:spLocks noGrp="1"/>
+          </p:cNvSpPr>
+          <p:nvPr>
+            <p:ph type="sldNum" sz="quarter" idx="10"/>
+          </p:nvPr>
+        </p:nvSpPr>
+        <p:spPr/>
+        <p:txBody>
+          <a:bodyPr/>
+          <a:lstStyle/>
+          <a:p>
+            <a:fld id="{3065D891-70D4-4D9A-B44B-CB5014DB94A4}" type="slidenum">
+              <a:rPr lang="fr-CH" smtClean="0"/>
+              <a:t>4</a:t>
+            </a:fld>
+            <a:endParaRPr lang="fr-CH"/>
+          </a:p>
+        </p:txBody>
+      </p:sp>
+    </p:spTree>
+    <p:extLst>
+      <p:ext uri="{BB962C8B-B14F-4D97-AF65-F5344CB8AC3E}">
+        <p14:creationId xmlns:p14="http://schemas.microsoft.com/office/powerpoint/2010/main" val="3922836803"/>
+      </p:ext>
+    </p:extLst>
+  </p:cSld>
+  <p:clrMapOvr>
+    <a:masterClrMapping/>
+  </p:clrMapOvr>
+</p:notes>
+</file>
+
+<file path=ppt/notesSlides/notesSlide5.xml><?xml version="1.0" encoding="utf-8"?>
+<p:notes xmlns:a="http://schemas.openxmlformats.org/drawingml/2006/main" xmlns:r="http://schemas.openxmlformats.org/officeDocument/2006/relationships" xmlns:p="http://schemas.openxmlformats.org/presentationml/2006/main">
+  <p:cSld>
+    <p:spTree>
+      <p:nvGrpSpPr>
+        <p:cNvPr id="1" name=""/>
+        <p:cNvGrpSpPr/>
+        <p:nvPr/>
+      </p:nvGrpSpPr>
+      <p:grpSpPr>
+        <a:xfrm>
+          <a:off x="0" y="0"/>
+          <a:ext cx="0" cy="0"/>
+          <a:chOff x="0" y="0"/>
+          <a:chExt cx="0" cy="0"/>
+        </a:xfrm>
+      </p:grpSpPr>
+      <p:sp>
+        <p:nvSpPr>
+          <p:cNvPr id="2" name="Espace réservé de l'image des diapositives 1"/>
+          <p:cNvSpPr>
+            <a:spLocks noGrp="1" noRot="1" noChangeAspect="1"/>
+          </p:cNvSpPr>
+          <p:nvPr>
+            <p:ph type="sldImg"/>
+          </p:nvPr>
+        </p:nvSpPr>
+        <p:spPr/>
+      </p:sp>
+      <p:sp>
+        <p:nvSpPr>
+          <p:cNvPr id="3" name="Espace réservé des notes 2"/>
+          <p:cNvSpPr>
+            <a:spLocks noGrp="1"/>
+          </p:cNvSpPr>
+          <p:nvPr>
+            <p:ph type="body" idx="1"/>
+          </p:nvPr>
+        </p:nvSpPr>
+        <p:spPr/>
+        <p:txBody>
+          <a:bodyPr/>
+          <a:lstStyle/>
+          <a:p>
+            <a:endParaRPr lang="fr-CH" dirty="0"/>
+          </a:p>
+        </p:txBody>
+      </p:sp>
+      <p:sp>
+        <p:nvSpPr>
+          <p:cNvPr id="4" name="Espace réservé du numéro de diapositive 3"/>
+          <p:cNvSpPr>
+            <a:spLocks noGrp="1"/>
+          </p:cNvSpPr>
+          <p:nvPr>
+            <p:ph type="sldNum" sz="quarter" idx="10"/>
+          </p:nvPr>
+        </p:nvSpPr>
+        <p:spPr/>
+        <p:txBody>
+          <a:bodyPr/>
+          <a:lstStyle/>
+          <a:p>
+            <a:fld id="{3065D891-70D4-4D9A-B44B-CB5014DB94A4}" type="slidenum">
+              <a:rPr lang="fr-CH" smtClean="0"/>
+              <a:t>5</a:t>
+            </a:fld>
+            <a:endParaRPr lang="fr-CH"/>
+          </a:p>
+        </p:txBody>
+      </p:sp>
+    </p:spTree>
+    <p:extLst>
+      <p:ext uri="{BB962C8B-B14F-4D97-AF65-F5344CB8AC3E}">
+        <p14:creationId xmlns:p14="http://schemas.microsoft.com/office/powerpoint/2010/main" val="437494214"/>
+      </p:ext>
+    </p:extLst>
+  </p:cSld>
+  <p:clrMapOvr>
+    <a:masterClrMapping/>
+  </p:clrMapOvr>
+</p:notes>
+</file>
+
+<file path=ppt/notesSlides/notesSlide6.xml><?xml version="1.0" encoding="utf-8"?>
+<p:notes xmlns:a="http://schemas.openxmlformats.org/drawingml/2006/main" xmlns:r="http://schemas.openxmlformats.org/officeDocument/2006/relationships" xmlns:p="http://schemas.openxmlformats.org/presentationml/2006/main">
+  <p:cSld>
+    <p:spTree>
+      <p:nvGrpSpPr>
+        <p:cNvPr id="1" name=""/>
+        <p:cNvGrpSpPr/>
+        <p:nvPr/>
+      </p:nvGrpSpPr>
+      <p:grpSpPr>
+        <a:xfrm>
+          <a:off x="0" y="0"/>
+          <a:ext cx="0" cy="0"/>
+          <a:chOff x="0" y="0"/>
+          <a:chExt cx="0" cy="0"/>
+        </a:xfrm>
+      </p:grpSpPr>
+      <p:sp>
+        <p:nvSpPr>
+          <p:cNvPr id="2" name="Espace réservé de l'image des diapositives 1"/>
+          <p:cNvSpPr>
+            <a:spLocks noGrp="1" noRot="1" noChangeAspect="1"/>
+          </p:cNvSpPr>
+          <p:nvPr>
+            <p:ph type="sldImg"/>
+          </p:nvPr>
+        </p:nvSpPr>
+        <p:spPr/>
+      </p:sp>
+      <p:sp>
+        <p:nvSpPr>
+          <p:cNvPr id="3" name="Espace réservé des notes 2"/>
+          <p:cNvSpPr>
+            <a:spLocks noGrp="1"/>
+          </p:cNvSpPr>
+          <p:nvPr>
+            <p:ph type="body" idx="1"/>
+          </p:nvPr>
+        </p:nvSpPr>
+        <p:spPr/>
+        <p:txBody>
+          <a:bodyPr/>
+          <a:lstStyle/>
+          <a:p>
+            <a:endParaRPr lang="fr-CH" dirty="0"/>
+          </a:p>
+        </p:txBody>
+      </p:sp>
+      <p:sp>
+        <p:nvSpPr>
+          <p:cNvPr id="4" name="Espace réservé du numéro de diapositive 3"/>
+          <p:cNvSpPr>
+            <a:spLocks noGrp="1"/>
+          </p:cNvSpPr>
+          <p:nvPr>
+            <p:ph type="sldNum" sz="quarter" idx="10"/>
+          </p:nvPr>
+        </p:nvSpPr>
+        <p:spPr/>
+        <p:txBody>
+          <a:bodyPr/>
+          <a:lstStyle/>
+          <a:p>
+            <a:fld id="{3065D891-70D4-4D9A-B44B-CB5014DB94A4}" type="slidenum">
+              <a:rPr lang="fr-CH" smtClean="0"/>
+              <a:t>6</a:t>
+            </a:fld>
+            <a:endParaRPr lang="fr-CH"/>
+          </a:p>
+        </p:txBody>
+      </p:sp>
+    </p:spTree>
+    <p:extLst>
+      <p:ext uri="{BB962C8B-B14F-4D97-AF65-F5344CB8AC3E}">
+        <p14:creationId xmlns:p14="http://schemas.microsoft.com/office/powerpoint/2010/main" val="174386726"/>
+      </p:ext>
+    </p:extLst>
+  </p:cSld>
+  <p:clrMapOvr>
+    <a:masterClrMapping/>
+  </p:clrMapOvr>
+</p:notes>
+</file>
+
+<file path=ppt/notesSlides/notesSlide7.xml><?xml version="1.0" encoding="utf-8"?>
+<p:notes xmlns:a="http://schemas.openxmlformats.org/drawingml/2006/main" xmlns:r="http://schemas.openxmlformats.org/officeDocument/2006/relationships" xmlns:p="http://schemas.openxmlformats.org/presentationml/2006/main">
+  <p:cSld>
+    <p:spTree>
+      <p:nvGrpSpPr>
+        <p:cNvPr id="1" name=""/>
+        <p:cNvGrpSpPr/>
+        <p:nvPr/>
+      </p:nvGrpSpPr>
+      <p:grpSpPr>
+        <a:xfrm>
+          <a:off x="0" y="0"/>
+          <a:ext cx="0" cy="0"/>
+          <a:chOff x="0" y="0"/>
+          <a:chExt cx="0" cy="0"/>
+        </a:xfrm>
+      </p:grpSpPr>
+      <p:sp>
+        <p:nvSpPr>
+          <p:cNvPr id="2" name="Espace réservé de l'image des diapositives 1"/>
+          <p:cNvSpPr>
+            <a:spLocks noGrp="1" noRot="1" noChangeAspect="1"/>
+          </p:cNvSpPr>
+          <p:nvPr>
+            <p:ph type="sldImg"/>
+          </p:nvPr>
+        </p:nvSpPr>
+        <p:spPr/>
+      </p:sp>
+      <p:sp>
+        <p:nvSpPr>
+          <p:cNvPr id="3" name="Espace réservé des notes 2"/>
+          <p:cNvSpPr>
+            <a:spLocks noGrp="1"/>
+          </p:cNvSpPr>
+          <p:nvPr>
+            <p:ph type="body" idx="1"/>
+          </p:nvPr>
+        </p:nvSpPr>
+        <p:spPr/>
+        <p:txBody>
+          <a:bodyPr/>
+          <a:lstStyle/>
+          <a:p>
+            <a:endParaRPr lang="fr-CH" dirty="0"/>
+          </a:p>
+        </p:txBody>
+      </p:sp>
+      <p:sp>
+        <p:nvSpPr>
+          <p:cNvPr id="4" name="Espace réservé du numéro de diapositive 3"/>
+          <p:cNvSpPr>
+            <a:spLocks noGrp="1"/>
+          </p:cNvSpPr>
+          <p:nvPr>
+            <p:ph type="sldNum" sz="quarter" idx="10"/>
+          </p:nvPr>
+        </p:nvSpPr>
+        <p:spPr/>
+        <p:txBody>
+          <a:bodyPr/>
+          <a:lstStyle/>
+          <a:p>
+            <a:fld id="{3065D891-70D4-4D9A-B44B-CB5014DB94A4}" type="slidenum">
+              <a:rPr lang="fr-CH" smtClean="0"/>
+              <a:t>7</a:t>
+            </a:fld>
+            <a:endParaRPr lang="fr-CH"/>
+          </a:p>
+        </p:txBody>
+      </p:sp>
+    </p:spTree>
+    <p:extLst>
+      <p:ext uri="{BB962C8B-B14F-4D97-AF65-F5344CB8AC3E}">
+        <p14:creationId xmlns:p14="http://schemas.microsoft.com/office/powerpoint/2010/main" val="3903274277"/>
+      </p:ext>
+    </p:extLst>
+  </p:cSld>
+  <p:clrMapOvr>
+    <a:masterClrMapping/>
+  </p:clrMapOvr>
+</p:notes>
+</file>
+
+<file path=ppt/notesSlides/notesSlide8.xml><?xml version="1.0" encoding="utf-8"?>
+<p:notes xmlns:a="http://schemas.openxmlformats.org/drawingml/2006/main" xmlns:r="http://schemas.openxmlformats.org/officeDocument/2006/relationships" xmlns:p="http://schemas.openxmlformats.org/presentationml/2006/main">
+  <p:cSld>
+    <p:spTree>
+      <p:nvGrpSpPr>
+        <p:cNvPr id="1" name=""/>
+        <p:cNvGrpSpPr/>
+        <p:nvPr/>
+      </p:nvGrpSpPr>
+      <p:grpSpPr>
+        <a:xfrm>
+          <a:off x="0" y="0"/>
+          <a:ext cx="0" cy="0"/>
+          <a:chOff x="0" y="0"/>
+          <a:chExt cx="0" cy="0"/>
+        </a:xfrm>
+      </p:grpSpPr>
+      <p:sp>
+        <p:nvSpPr>
+          <p:cNvPr id="2" name="Espace réservé de l'image des diapositives 1"/>
+          <p:cNvSpPr>
+            <a:spLocks noGrp="1" noRot="1" noChangeAspect="1"/>
+          </p:cNvSpPr>
+          <p:nvPr>
+            <p:ph type="sldImg"/>
+          </p:nvPr>
+        </p:nvSpPr>
+        <p:spPr/>
+      </p:sp>
+      <p:sp>
+        <p:nvSpPr>
+          <p:cNvPr id="3" name="Espace réservé des notes 2"/>
+          <p:cNvSpPr>
+            <a:spLocks noGrp="1"/>
+          </p:cNvSpPr>
+          <p:nvPr>
+            <p:ph type="body" idx="1"/>
+          </p:nvPr>
+        </p:nvSpPr>
+        <p:spPr/>
+        <p:txBody>
+          <a:bodyPr/>
+          <a:lstStyle/>
+          <a:p>
+            <a:endParaRPr lang="fr-CH" dirty="0"/>
+          </a:p>
+        </p:txBody>
+      </p:sp>
+      <p:sp>
+        <p:nvSpPr>
+          <p:cNvPr id="4" name="Espace réservé du numéro de diapositive 3"/>
+          <p:cNvSpPr>
+            <a:spLocks noGrp="1"/>
+          </p:cNvSpPr>
+          <p:nvPr>
+            <p:ph type="sldNum" sz="quarter" idx="10"/>
+          </p:nvPr>
+        </p:nvSpPr>
+        <p:spPr/>
+        <p:txBody>
+          <a:bodyPr/>
+          <a:lstStyle/>
+          <a:p>
+            <a:fld id="{3065D891-70D4-4D9A-B44B-CB5014DB94A4}" type="slidenum">
+              <a:rPr lang="fr-CH" smtClean="0"/>
+              <a:t>8</a:t>
+            </a:fld>
+            <a:endParaRPr lang="fr-CH"/>
+          </a:p>
+        </p:txBody>
+      </p:sp>
+    </p:spTree>
+    <p:extLst>
+      <p:ext uri="{BB962C8B-B14F-4D97-AF65-F5344CB8AC3E}">
+        <p14:creationId xmlns:p14="http://schemas.microsoft.com/office/powerpoint/2010/main" val="1561954802"/>
+      </p:ext>
+    </p:extLst>
+  </p:cSld>
+  <p:clrMapOvr>
+    <a:masterClrMapping/>
+  </p:clrMapOvr>
+</p:notes>
+</file>
+
+<file path=ppt/notesSlides/notesSlide9.xml><?xml version="1.0" encoding="utf-8"?>
+<p:notes xmlns:a="http://schemas.openxmlformats.org/drawingml/2006/main" xmlns:r="http://schemas.openxmlformats.org/officeDocument/2006/relationships" xmlns:p="http://schemas.openxmlformats.org/presentationml/2006/main">
+  <p:cSld>
+    <p:spTree>
+      <p:nvGrpSpPr>
+        <p:cNvPr id="1" name=""/>
+        <p:cNvGrpSpPr/>
+        <p:nvPr/>
+      </p:nvGrpSpPr>
+      <p:grpSpPr>
+        <a:xfrm>
+          <a:off x="0" y="0"/>
+          <a:ext cx="0" cy="0"/>
+          <a:chOff x="0" y="0"/>
+          <a:chExt cx="0" cy="0"/>
+        </a:xfrm>
+      </p:grpSpPr>
+      <p:sp>
+        <p:nvSpPr>
+          <p:cNvPr id="2" name="Espace réservé de l'image des diapositives 1"/>
+          <p:cNvSpPr>
+            <a:spLocks noGrp="1" noRot="1" noChangeAspect="1"/>
+          </p:cNvSpPr>
+          <p:nvPr>
+            <p:ph type="sldImg"/>
+          </p:nvPr>
+        </p:nvSpPr>
+        <p:spPr/>
+      </p:sp>
+      <p:sp>
+        <p:nvSpPr>
+          <p:cNvPr id="3" name="Espace réservé des notes 2"/>
+          <p:cNvSpPr>
+            <a:spLocks noGrp="1"/>
+          </p:cNvSpPr>
+          <p:nvPr>
+            <p:ph type="body" idx="1"/>
+          </p:nvPr>
+        </p:nvSpPr>
+        <p:spPr/>
+        <p:txBody>
+          <a:bodyPr/>
+          <a:lstStyle/>
+          <a:p>
+            <a:endParaRPr lang="fr-CH" dirty="0"/>
+          </a:p>
+        </p:txBody>
+      </p:sp>
+      <p:sp>
+        <p:nvSpPr>
+          <p:cNvPr id="4" name="Espace réservé du numéro de diapositive 3"/>
+          <p:cNvSpPr>
+            <a:spLocks noGrp="1"/>
+          </p:cNvSpPr>
+          <p:nvPr>
+            <p:ph type="sldNum" sz="quarter" idx="10"/>
+          </p:nvPr>
+        </p:nvSpPr>
+        <p:spPr/>
+        <p:txBody>
+          <a:bodyPr/>
+          <a:lstStyle/>
+          <a:p>
+            <a:fld id="{3065D891-70D4-4D9A-B44B-CB5014DB94A4}" type="slidenum">
+              <a:rPr lang="fr-CH" smtClean="0"/>
+              <a:t>9</a:t>
+            </a:fld>
+            <a:endParaRPr lang="fr-CH"/>
+          </a:p>
+        </p:txBody>
+      </p:sp>
+    </p:spTree>
+    <p:extLst>
+      <p:ext uri="{BB962C8B-B14F-4D97-AF65-F5344CB8AC3E}">
+        <p14:creationId xmlns:p14="http://schemas.microsoft.com/office/powerpoint/2010/main" val="183741276"/>
+      </p:ext>
+    </p:extLst>
+  </p:cSld>
+  <p:clrMapOvr>
+    <a:masterClrMapping/>
+  </p:clrMapOvr>
+</p:notes>
 </file>
 
 <file path=ppt/slideLayouts/slideLayout1.xml><?xml version="1.0" encoding="utf-8"?>
@@ -4567,7 +6079,7 @@
           <p:nvPr/>
         </p:nvPicPr>
         <p:blipFill>
-          <a:blip r:embed="rId2">
+          <a:blip r:embed="rId3">
             <a:extLst>
               <a:ext uri="{28A0092B-C50C-407E-A947-70E740481C1C}">
                 <a14:useLocalDpi xmlns:a14="http://schemas.microsoft.com/office/drawing/2010/main" val="0"/>
@@ -4614,7 +6126,7 @@
           <p:nvPr/>
         </p:nvPicPr>
         <p:blipFill>
-          <a:blip r:embed="rId3">
+          <a:blip r:embed="rId4">
             <a:extLst>
               <a:ext uri="{28A0092B-C50C-407E-A947-70E740481C1C}">
                 <a14:useLocalDpi xmlns:a14="http://schemas.microsoft.com/office/drawing/2010/main" val="0"/>
@@ -4721,7 +6233,7 @@
           </p:nvPr>
         </p:nvPicPr>
         <p:blipFill>
-          <a:blip r:embed="rId2">
+          <a:blip r:embed="rId3">
             <a:extLst>
               <a:ext uri="{28A0092B-C50C-407E-A947-70E740481C1C}">
                 <a14:useLocalDpi xmlns:a14="http://schemas.microsoft.com/office/drawing/2010/main" val="0"/>
@@ -4905,7 +6417,56 @@
           <a:bodyPr/>
           <a:lstStyle/>
           <a:p>
+            <a:r>
+              <a:rPr lang="fr-CH" dirty="0"/>
+              <a:t> Protocole </a:t>
+            </a:r>
+          </a:p>
+          <a:p>
+            <a:pPr lvl="1"/>
+            <a:r>
+              <a:rPr lang="fr-CH" dirty="0" err="1"/>
+              <a:t>Stateless</a:t>
+            </a:r>
             <a:endParaRPr lang="fr-CH" dirty="0"/>
+          </a:p>
+          <a:p>
+            <a:pPr lvl="1"/>
+            <a:r>
+              <a:rPr lang="fr-CH" dirty="0"/>
+              <a:t>TCP</a:t>
+            </a:r>
+          </a:p>
+          <a:p>
+            <a:r>
+              <a:rPr lang="fr-CH" dirty="0"/>
+              <a:t> </a:t>
+            </a:r>
+            <a:r>
+              <a:rPr lang="fr-CH" dirty="0" err="1"/>
+              <a:t>Serialisation</a:t>
+            </a:r>
+            <a:endParaRPr lang="fr-CH" dirty="0"/>
+          </a:p>
+          <a:p>
+            <a:pPr lvl="1"/>
+            <a:r>
+              <a:rPr lang="fr-CH" dirty="0"/>
+              <a:t>JSON</a:t>
+            </a:r>
+          </a:p>
+          <a:p>
+            <a:r>
+              <a:rPr lang="fr-CH" dirty="0"/>
+              <a:t>Serveur multi-connexions</a:t>
+            </a:r>
+          </a:p>
+          <a:p>
+            <a:pPr lvl="1"/>
+            <a:r>
+              <a:rPr lang="fr-CH" dirty="0"/>
+              <a:t>Threading par client</a:t>
+            </a:r>
           </a:p>
         </p:txBody>
       </p:sp>
@@ -5024,6 +6585,40 @@
           <a:chExt cx="0" cy="0"/>
         </a:xfrm>
       </p:grpSpPr>
+      <p:pic>
+        <p:nvPicPr>
+          <p:cNvPr id="16" name="Espace réservé du contenu 15" descr="Dessin1 - Visio Professionnel">
+            <a:extLst>
+              <a:ext uri="{FF2B5EF4-FFF2-40B4-BE49-F238E27FC236}">
+                <a16:creationId xmlns:a16="http://schemas.microsoft.com/office/drawing/2014/main" id="{DF023AA4-A147-452D-A841-C3783ECF3EC1}"/>
+              </a:ext>
+            </a:extLst>
+          </p:cNvPr>
+          <p:cNvPicPr>
+            <a:picLocks noGrp="1" noChangeAspect="1"/>
+          </p:cNvPicPr>
+          <p:nvPr>
+            <p:ph idx="1"/>
+          </p:nvPr>
+        </p:nvPicPr>
+        <p:blipFill rotWithShape="1">
+          <a:blip r:embed="rId3">
+            <a:extLst>
+              <a:ext uri="{28A0092B-C50C-407E-A947-70E740481C1C}">
+                <a14:useLocalDpi xmlns:a14="http://schemas.microsoft.com/office/drawing/2010/main" val="0"/>
+              </a:ext>
+            </a:extLst>
+          </a:blip>
+          <a:srcRect l="19992" t="24428" r="10908" b="12588"/>
+          <a:stretch/>
+        </p:blipFill>
+        <p:spPr>
+          <a:xfrm>
+            <a:off x="2159070" y="2001150"/>
+            <a:ext cx="7741388" cy="3885300"/>
+          </a:xfrm>
+        </p:spPr>
+      </p:pic>
       <p:sp>
         <p:nvSpPr>
           <p:cNvPr id="2" name="Titre 1">
@@ -5056,69 +6651,6 @@
       </p:sp>
       <p:sp>
         <p:nvSpPr>
-          <p:cNvPr id="3" name="Espace réservé du contenu 2">
-            <a:extLst>
-              <a:ext uri="{FF2B5EF4-FFF2-40B4-BE49-F238E27FC236}">
-                <a16:creationId xmlns:a16="http://schemas.microsoft.com/office/drawing/2014/main" id="{2E5C1508-2033-410E-BF12-FECDC8769D81}"/>
-              </a:ext>
-            </a:extLst>
-          </p:cNvPr>
-          <p:cNvSpPr>
-            <a:spLocks noGrp="1"/>
-          </p:cNvSpPr>
-          <p:nvPr>
-            <p:ph idx="1"/>
-          </p:nvPr>
-        </p:nvSpPr>
-        <p:spPr/>
-        <p:txBody>
-          <a:bodyPr>
-            <a:normAutofit/>
-          </a:bodyPr>
-          <a:lstStyle/>
-          <a:p>
-            <a:r>
-              <a:rPr lang="fr-FR" dirty="0"/>
-              <a:t>Récupérer les infos enregistrées par le GUI</a:t>
-            </a:r>
-          </a:p>
-          <a:p>
-            <a:r>
-              <a:rPr lang="fr-FR" dirty="0"/>
-              <a:t>Traitement et transfère à la partie réseau        </a:t>
-            </a:r>
-          </a:p>
-          <a:p>
-            <a:r>
-              <a:rPr lang="fr-FR" dirty="0"/>
-              <a:t>Récupération du résultat renvoyé par le serveur</a:t>
-            </a:r>
-          </a:p>
-          <a:p>
-            <a:r>
-              <a:rPr lang="fr-FR" dirty="0"/>
-              <a:t>Traitement et décision en fonction du type de requête utilisateur</a:t>
-            </a:r>
-          </a:p>
-          <a:p>
-            <a:pPr lvl="1"/>
-            <a:r>
-              <a:rPr lang="fr-FR" dirty="0"/>
-              <a:t>Transformations des infos pour la transmissions au GUI</a:t>
-            </a:r>
-          </a:p>
-          <a:p>
-            <a:pPr lvl="1"/>
-            <a:r>
-              <a:rPr lang="fr-FR" dirty="0"/>
-              <a:t>Création et ouverture d'un fichier contenant les résultats</a:t>
-            </a:r>
-            <a:endParaRPr lang="fr-CH" dirty="0"/>
-          </a:p>
-        </p:txBody>
-      </p:sp>
-      <p:sp>
-        <p:nvSpPr>
           <p:cNvPr id="4" name="Espace réservé de la date 3">
             <a:extLst>
               <a:ext uri="{FF2B5EF4-FFF2-40B4-BE49-F238E27FC236}">
@@ -5199,6 +6731,173 @@
               <a:t>12</a:t>
             </a:fld>
             <a:endParaRPr lang="fr-CH"/>
+          </a:p>
+        </p:txBody>
+      </p:sp>
+      <p:sp>
+        <p:nvSpPr>
+          <p:cNvPr id="9" name="ZoneTexte 8">
+            <a:extLst>
+              <a:ext uri="{FF2B5EF4-FFF2-40B4-BE49-F238E27FC236}">
+                <a16:creationId xmlns:a16="http://schemas.microsoft.com/office/drawing/2014/main" id="{37A71E1B-8D40-452D-8DDE-A32BCA092EBA}"/>
+              </a:ext>
+            </a:extLst>
+          </p:cNvPr>
+          <p:cNvSpPr txBox="1"/>
+          <p:nvPr/>
+        </p:nvSpPr>
+        <p:spPr>
+          <a:xfrm>
+            <a:off x="3712373" y="2269182"/>
+            <a:ext cx="1666866" cy="646331"/>
+          </a:xfrm>
+          <a:prstGeom prst="rect">
+            <a:avLst/>
+          </a:prstGeom>
+          <a:noFill/>
+        </p:spPr>
+        <p:txBody>
+          <a:bodyPr wrap="square" rtlCol="0">
+            <a:spAutoFit/>
+          </a:bodyPr>
+          <a:lstStyle/>
+          <a:p>
+            <a:r>
+              <a:rPr lang="fr-CH" dirty="0"/>
+              <a:t>Récupération</a:t>
+            </a:r>
+            <a:br>
+              <a:rPr lang="fr-CH" dirty="0"/>
+            </a:br>
+            <a:r>
+              <a:rPr lang="fr-CH" dirty="0"/>
+              <a:t>info utilisateur</a:t>
+            </a:r>
+          </a:p>
+        </p:txBody>
+      </p:sp>
+      <p:sp>
+        <p:nvSpPr>
+          <p:cNvPr id="10" name="ZoneTexte 9">
+            <a:extLst>
+              <a:ext uri="{FF2B5EF4-FFF2-40B4-BE49-F238E27FC236}">
+                <a16:creationId xmlns:a16="http://schemas.microsoft.com/office/drawing/2014/main" id="{ED1256FD-6DD7-46E5-9019-DC7BE9C2DFBC}"/>
+              </a:ext>
+            </a:extLst>
+          </p:cNvPr>
+          <p:cNvSpPr txBox="1"/>
+          <p:nvPr/>
+        </p:nvSpPr>
+        <p:spPr>
+          <a:xfrm>
+            <a:off x="6967537" y="2407682"/>
+            <a:ext cx="1485900" cy="646331"/>
+          </a:xfrm>
+          <a:prstGeom prst="rect">
+            <a:avLst/>
+          </a:prstGeom>
+          <a:noFill/>
+        </p:spPr>
+        <p:txBody>
+          <a:bodyPr wrap="square" rtlCol="0">
+            <a:spAutoFit/>
+          </a:bodyPr>
+          <a:lstStyle/>
+          <a:p>
+            <a:r>
+              <a:rPr lang="fr-CH" dirty="0"/>
+              <a:t>Transfert </a:t>
+            </a:r>
+            <a:br>
+              <a:rPr lang="fr-CH" dirty="0"/>
+            </a:br>
+            <a:r>
+              <a:rPr lang="fr-CH" dirty="0"/>
+              <a:t>demande</a:t>
+            </a:r>
+          </a:p>
+        </p:txBody>
+      </p:sp>
+      <p:sp>
+        <p:nvSpPr>
+          <p:cNvPr id="11" name="ZoneTexte 10">
+            <a:extLst>
+              <a:ext uri="{FF2B5EF4-FFF2-40B4-BE49-F238E27FC236}">
+                <a16:creationId xmlns:a16="http://schemas.microsoft.com/office/drawing/2014/main" id="{E2757067-516D-47B5-A113-20F47499A458}"/>
+              </a:ext>
+            </a:extLst>
+          </p:cNvPr>
+          <p:cNvSpPr txBox="1"/>
+          <p:nvPr/>
+        </p:nvSpPr>
+        <p:spPr>
+          <a:xfrm>
+            <a:off x="6967537" y="4840932"/>
+            <a:ext cx="1666866" cy="646331"/>
+          </a:xfrm>
+          <a:prstGeom prst="rect">
+            <a:avLst/>
+          </a:prstGeom>
+          <a:noFill/>
+        </p:spPr>
+        <p:txBody>
+          <a:bodyPr wrap="square" rtlCol="0">
+            <a:spAutoFit/>
+          </a:bodyPr>
+          <a:lstStyle/>
+          <a:p>
+            <a:r>
+              <a:rPr lang="fr-CH" dirty="0"/>
+              <a:t>Récupération</a:t>
+            </a:r>
+            <a:br>
+              <a:rPr lang="fr-CH" dirty="0"/>
+            </a:br>
+            <a:r>
+              <a:rPr lang="fr-CH" dirty="0"/>
+              <a:t>résultat</a:t>
+            </a:r>
+          </a:p>
+        </p:txBody>
+      </p:sp>
+      <p:sp>
+        <p:nvSpPr>
+          <p:cNvPr id="12" name="ZoneTexte 11">
+            <a:extLst>
+              <a:ext uri="{FF2B5EF4-FFF2-40B4-BE49-F238E27FC236}">
+                <a16:creationId xmlns:a16="http://schemas.microsoft.com/office/drawing/2014/main" id="{FEAE6C0B-FEDE-4C88-8A2D-59C8C97370EA}"/>
+              </a:ext>
+            </a:extLst>
+          </p:cNvPr>
+          <p:cNvSpPr txBox="1"/>
+          <p:nvPr/>
+        </p:nvSpPr>
+        <p:spPr>
+          <a:xfrm>
+            <a:off x="3712373" y="4840932"/>
+            <a:ext cx="1666866" cy="646331"/>
+          </a:xfrm>
+          <a:prstGeom prst="rect">
+            <a:avLst/>
+          </a:prstGeom>
+          <a:noFill/>
+        </p:spPr>
+        <p:txBody>
+          <a:bodyPr wrap="square" rtlCol="0">
+            <a:spAutoFit/>
+          </a:bodyPr>
+          <a:lstStyle/>
+          <a:p>
+            <a:r>
+              <a:rPr lang="fr-CH" dirty="0"/>
+              <a:t>Transmission</a:t>
+            </a:r>
+          </a:p>
+          <a:p>
+            <a:r>
+              <a:rPr lang="fr-CH" dirty="0"/>
+              <a:t>résultat traité</a:t>
+            </a:r>
           </a:p>
         </p:txBody>
       </p:sp>
@@ -5331,7 +7030,7 @@
             </a:pPr>
             <a:r>
               <a:rPr lang="fr-CH" dirty="0"/>
-              <a:t>Traitement des fichier SVG</a:t>
+              <a:t>Traitement des fichiers SVG</a:t>
             </a:r>
           </a:p>
           <a:p>
@@ -5537,7 +7236,7 @@
           <a:p>
             <a:r>
               <a:rPr lang="fr-CH" dirty="0"/>
-              <a:t>Division de la charge de travail</a:t>
+              <a:t>Répartition de la charge de travail</a:t>
             </a:r>
           </a:p>
           <a:p>
@@ -5754,25 +7453,16 @@
           <a:p>
             <a:r>
               <a:rPr lang="fr-CH" dirty="0"/>
-              <a:t>La partie 2 de l’étage B est corrompu</a:t>
-            </a:r>
-          </a:p>
-          <a:p>
-            <a:pPr lvl="1"/>
+              <a:t>Fichier source d’un plan corrompu</a:t>
+            </a:r>
+          </a:p>
+          <a:p>
             <a:endParaRPr lang="fr-CH" dirty="0"/>
           </a:p>
           <a:p>
             <a:r>
               <a:rPr lang="fr-CH" dirty="0"/>
-              <a:t>Améliorer la partie «</a:t>
-            </a:r>
-            <a:r>
-              <a:rPr lang="fr-CH" dirty="0" err="1"/>
-              <a:t>remote</a:t>
-            </a:r>
-            <a:r>
-              <a:rPr lang="fr-CH" dirty="0"/>
-              <a:t> server»</a:t>
+              <a:t>Demande d’horaire par salle parfois corrompue</a:t>
             </a:r>
           </a:p>
         </p:txBody>
@@ -5897,7 +7587,7 @@
           <p:cNvPr id="2" name="Titre 1">
             <a:extLst>
               <a:ext uri="{FF2B5EF4-FFF2-40B4-BE49-F238E27FC236}">
-                <a16:creationId xmlns:a16="http://schemas.microsoft.com/office/drawing/2014/main" id="{2791BDE7-4268-4F71-802B-89BB7E0C0281}"/>
+                <a16:creationId xmlns:a16="http://schemas.microsoft.com/office/drawing/2014/main" id="{B2B8E4E9-E17E-45A2-962B-D22F495A8E98}"/>
               </a:ext>
             </a:extLst>
           </p:cNvPr>
@@ -5910,24 +7600,22 @@
         </p:nvSpPr>
         <p:spPr/>
         <p:txBody>
-          <a:bodyPr>
-            <a:normAutofit fontScale="90000"/>
-          </a:bodyPr>
+          <a:bodyPr/>
           <a:lstStyle/>
           <a:p>
             <a:r>
               <a:rPr lang="fr-CH" dirty="0"/>
-              <a:t>Conclusion sur le travail en groupe</a:t>
-            </a:r>
-          </a:p>
-        </p:txBody>
-      </p:sp>
-      <p:sp>
-        <p:nvSpPr>
-          <p:cNvPr id="3" name="Espace réservé du contenu 2">
+              <a:t>Démo</a:t>
+            </a:r>
+          </a:p>
+        </p:txBody>
+      </p:sp>
+      <p:sp>
+        <p:nvSpPr>
+          <p:cNvPr id="3" name="Espace réservé du texte 2">
             <a:extLst>
               <a:ext uri="{FF2B5EF4-FFF2-40B4-BE49-F238E27FC236}">
-                <a16:creationId xmlns:a16="http://schemas.microsoft.com/office/drawing/2014/main" id="{FAF3E672-4E32-4A38-8DB7-AECD6FF19FEE}"/>
+                <a16:creationId xmlns:a16="http://schemas.microsoft.com/office/drawing/2014/main" id="{A4575B98-7929-4274-83B2-D7447CB49B40}"/>
               </a:ext>
             </a:extLst>
           </p:cNvPr>
@@ -5935,34 +7623,15 @@
             <a:spLocks noGrp="1"/>
           </p:cNvSpPr>
           <p:nvPr>
-            <p:ph idx="1"/>
-          </p:nvPr>
-        </p:nvSpPr>
-        <p:spPr/>
-        <p:txBody>
-          <a:bodyPr/>
-          <a:lstStyle/>
-          <a:p>
-            <a:pPr marL="0" indent="0">
-              <a:buNone/>
-            </a:pPr>
-            <a:r>
-              <a:rPr lang="fr-CH" dirty="0"/>
-              <a:t>Beaucoup de temps nécessaire à la coordination des tâches</a:t>
-            </a:r>
-          </a:p>
-          <a:p>
-            <a:pPr marL="658368" lvl="1" indent="-457200"/>
-            <a:endParaRPr lang="fr-CH" dirty="0"/>
-          </a:p>
-          <a:p>
-            <a:pPr marL="0" indent="0">
-              <a:buNone/>
-            </a:pPr>
-            <a:r>
-              <a:rPr lang="fr-CH" dirty="0"/>
-              <a:t>De nombreuses réunions ont été faites</a:t>
-            </a:r>
+            <p:ph type="body" idx="1"/>
+          </p:nvPr>
+        </p:nvSpPr>
+        <p:spPr/>
+        <p:txBody>
+          <a:bodyPr/>
+          <a:lstStyle/>
+          <a:p>
+            <a:endParaRPr lang="fr-CH"/>
           </a:p>
         </p:txBody>
       </p:sp>
@@ -5971,7 +7640,7 @@
           <p:cNvPr id="4" name="Espace réservé de la date 3">
             <a:extLst>
               <a:ext uri="{FF2B5EF4-FFF2-40B4-BE49-F238E27FC236}">
-                <a16:creationId xmlns:a16="http://schemas.microsoft.com/office/drawing/2014/main" id="{F158B539-6BDA-4726-AC84-3B50141FAC13}"/>
+                <a16:creationId xmlns:a16="http://schemas.microsoft.com/office/drawing/2014/main" id="{34D1F7A2-8412-41E2-9C96-9A71ACFB2009}"/>
               </a:ext>
             </a:extLst>
           </p:cNvPr>
@@ -5999,7 +7668,7 @@
           <p:cNvPr id="5" name="Espace réservé du pied de page 4">
             <a:extLst>
               <a:ext uri="{FF2B5EF4-FFF2-40B4-BE49-F238E27FC236}">
-                <a16:creationId xmlns:a16="http://schemas.microsoft.com/office/drawing/2014/main" id="{2C6E5602-6886-421F-A3DB-3FCEC1567A67}"/>
+                <a16:creationId xmlns:a16="http://schemas.microsoft.com/office/drawing/2014/main" id="{CA7FA3CB-2CEC-4507-B526-0D436CEFD053}"/>
               </a:ext>
             </a:extLst>
           </p:cNvPr>
@@ -6027,7 +7696,7 @@
           <p:cNvPr id="6" name="Espace réservé du numéro de diapositive 5">
             <a:extLst>
               <a:ext uri="{FF2B5EF4-FFF2-40B4-BE49-F238E27FC236}">
-                <a16:creationId xmlns:a16="http://schemas.microsoft.com/office/drawing/2014/main" id="{BE558349-54D1-41BD-9C6A-202999E2C9B9}"/>
+                <a16:creationId xmlns:a16="http://schemas.microsoft.com/office/drawing/2014/main" id="{12AD4057-6EEB-42E7-8AE9-58ACD1F16443}"/>
               </a:ext>
             </a:extLst>
           </p:cNvPr>
@@ -6054,7 +7723,7 @@
     </p:spTree>
     <p:extLst>
       <p:ext uri="{BB962C8B-B14F-4D97-AF65-F5344CB8AC3E}">
-        <p14:creationId xmlns:p14="http://schemas.microsoft.com/office/powerpoint/2010/main" val="2651892989"/>
+        <p14:creationId xmlns:p14="http://schemas.microsoft.com/office/powerpoint/2010/main" val="2800174220"/>
       </p:ext>
     </p:extLst>
   </p:cSld>
@@ -6285,7 +7954,7 @@
           <p:cNvPr id="2" name="Titre 1">
             <a:extLst>
               <a:ext uri="{FF2B5EF4-FFF2-40B4-BE49-F238E27FC236}">
-                <a16:creationId xmlns:a16="http://schemas.microsoft.com/office/drawing/2014/main" id="{B2B8E4E9-E17E-45A2-962B-D22F495A8E98}"/>
+                <a16:creationId xmlns:a16="http://schemas.microsoft.com/office/drawing/2014/main" id="{2791BDE7-4268-4F71-802B-89BB7E0C0281}"/>
               </a:ext>
             </a:extLst>
           </p:cNvPr>
@@ -6298,22 +7967,24 @@
         </p:nvSpPr>
         <p:spPr/>
         <p:txBody>
-          <a:bodyPr/>
+          <a:bodyPr>
+            <a:normAutofit fontScale="90000"/>
+          </a:bodyPr>
           <a:lstStyle/>
           <a:p>
             <a:r>
               <a:rPr lang="fr-CH" dirty="0"/>
-              <a:t>Démo</a:t>
-            </a:r>
-          </a:p>
-        </p:txBody>
-      </p:sp>
-      <p:sp>
-        <p:nvSpPr>
-          <p:cNvPr id="3" name="Espace réservé du texte 2">
+              <a:t>Conclusion sur le travail en groupe</a:t>
+            </a:r>
+          </a:p>
+        </p:txBody>
+      </p:sp>
+      <p:sp>
+        <p:nvSpPr>
+          <p:cNvPr id="3" name="Espace réservé du contenu 2">
             <a:extLst>
               <a:ext uri="{FF2B5EF4-FFF2-40B4-BE49-F238E27FC236}">
-                <a16:creationId xmlns:a16="http://schemas.microsoft.com/office/drawing/2014/main" id="{A4575B98-7929-4274-83B2-D7447CB49B40}"/>
+                <a16:creationId xmlns:a16="http://schemas.microsoft.com/office/drawing/2014/main" id="{FAF3E672-4E32-4A38-8DB7-AECD6FF19FEE}"/>
               </a:ext>
             </a:extLst>
           </p:cNvPr>
@@ -6321,15 +7992,34 @@
             <a:spLocks noGrp="1"/>
           </p:cNvSpPr>
           <p:nvPr>
-            <p:ph type="body" idx="1"/>
-          </p:nvPr>
-        </p:nvSpPr>
-        <p:spPr/>
-        <p:txBody>
-          <a:bodyPr/>
-          <a:lstStyle/>
-          <a:p>
-            <a:endParaRPr lang="fr-CH"/>
+            <p:ph idx="1"/>
+          </p:nvPr>
+        </p:nvSpPr>
+        <p:spPr/>
+        <p:txBody>
+          <a:bodyPr/>
+          <a:lstStyle/>
+          <a:p>
+            <a:pPr marL="0" indent="0">
+              <a:buNone/>
+            </a:pPr>
+            <a:r>
+              <a:rPr lang="fr-CH" dirty="0"/>
+              <a:t>Beaucoup de temps nécessaire à la coordination des tâches</a:t>
+            </a:r>
+          </a:p>
+          <a:p>
+            <a:pPr marL="658368" lvl="1" indent="-457200"/>
+            <a:endParaRPr lang="fr-CH" dirty="0"/>
+          </a:p>
+          <a:p>
+            <a:pPr marL="0" indent="0">
+              <a:buNone/>
+            </a:pPr>
+            <a:r>
+              <a:rPr lang="fr-CH" dirty="0"/>
+              <a:t>De nombreuses réunions ont été faites</a:t>
+            </a:r>
           </a:p>
         </p:txBody>
       </p:sp>
@@ -6338,7 +8028,7 @@
           <p:cNvPr id="4" name="Espace réservé de la date 3">
             <a:extLst>
               <a:ext uri="{FF2B5EF4-FFF2-40B4-BE49-F238E27FC236}">
-                <a16:creationId xmlns:a16="http://schemas.microsoft.com/office/drawing/2014/main" id="{34D1F7A2-8412-41E2-9C96-9A71ACFB2009}"/>
+                <a16:creationId xmlns:a16="http://schemas.microsoft.com/office/drawing/2014/main" id="{F158B539-6BDA-4726-AC84-3B50141FAC13}"/>
               </a:ext>
             </a:extLst>
           </p:cNvPr>
@@ -6366,7 +8056,7 @@
           <p:cNvPr id="5" name="Espace réservé du pied de page 4">
             <a:extLst>
               <a:ext uri="{FF2B5EF4-FFF2-40B4-BE49-F238E27FC236}">
-                <a16:creationId xmlns:a16="http://schemas.microsoft.com/office/drawing/2014/main" id="{CA7FA3CB-2CEC-4507-B526-0D436CEFD053}"/>
+                <a16:creationId xmlns:a16="http://schemas.microsoft.com/office/drawing/2014/main" id="{2C6E5602-6886-421F-A3DB-3FCEC1567A67}"/>
               </a:ext>
             </a:extLst>
           </p:cNvPr>
@@ -6394,7 +8084,7 @@
           <p:cNvPr id="6" name="Espace réservé du numéro de diapositive 5">
             <a:extLst>
               <a:ext uri="{FF2B5EF4-FFF2-40B4-BE49-F238E27FC236}">
-                <a16:creationId xmlns:a16="http://schemas.microsoft.com/office/drawing/2014/main" id="{12AD4057-6EEB-42E7-8AE9-58ACD1F16443}"/>
+                <a16:creationId xmlns:a16="http://schemas.microsoft.com/office/drawing/2014/main" id="{BE558349-54D1-41BD-9C6A-202999E2C9B9}"/>
               </a:ext>
             </a:extLst>
           </p:cNvPr>
@@ -6421,7 +8111,7 @@
     </p:spTree>
     <p:extLst>
       <p:ext uri="{BB962C8B-B14F-4D97-AF65-F5344CB8AC3E}">
-        <p14:creationId xmlns:p14="http://schemas.microsoft.com/office/powerpoint/2010/main" val="2800174220"/>
+        <p14:creationId xmlns:p14="http://schemas.microsoft.com/office/powerpoint/2010/main" val="2651892989"/>
       </p:ext>
     </p:extLst>
   </p:cSld>
@@ -7358,7 +9048,7 @@
           </p:nvPr>
         </p:nvPicPr>
         <p:blipFill rotWithShape="1">
-          <a:blip r:embed="rId2">
+          <a:blip r:embed="rId3">
             <a:extLst>
               <a:ext uri="{28A0092B-C50C-407E-A947-70E740481C1C}">
                 <a14:useLocalDpi xmlns:a14="http://schemas.microsoft.com/office/drawing/2010/main" val="0"/>
@@ -8514,7 +10204,7 @@
           <p:nvPr/>
         </p:nvPicPr>
         <p:blipFill rotWithShape="1">
-          <a:blip r:embed="rId2"/>
+          <a:blip r:embed="rId3"/>
           <a:srcRect l="2171" t="1300" r="1774" b="1665"/>
           <a:stretch/>
         </p:blipFill>
@@ -8543,7 +10233,7 @@
           <p:nvPr/>
         </p:nvPicPr>
         <p:blipFill>
-          <a:blip r:embed="rId3"/>
+          <a:blip r:embed="rId4"/>
           <a:stretch>
             <a:fillRect/>
           </a:stretch>
@@ -8774,7 +10464,7 @@
           <p:nvPr/>
         </p:nvPicPr>
         <p:blipFill>
-          <a:blip r:embed="rId2">
+          <a:blip r:embed="rId3">
             <a:extLst>
               <a:ext uri="{28A0092B-C50C-407E-A947-70E740481C1C}">
                 <a14:useLocalDpi xmlns:a14="http://schemas.microsoft.com/office/drawing/2010/main" val="0"/>
@@ -8810,7 +10500,7 @@
           <p:nvPr/>
         </p:nvPicPr>
         <p:blipFill>
-          <a:blip r:embed="rId3">
+          <a:blip r:embed="rId4">
             <a:extLst>
               <a:ext uri="{28A0092B-C50C-407E-A947-70E740481C1C}">
                 <a14:useLocalDpi xmlns:a14="http://schemas.microsoft.com/office/drawing/2010/main" val="0"/>

</xml_diff>